<commit_message>
update precision vs recall
</commit_message>
<xml_diff>
--- a/images/precision_vs_recall.pptx
+++ b/images/precision_vs_recall.pptx
@@ -259,7 +259,7 @@
           <a:p>
             <a:fld id="{0472640E-5220-4745-A811-F41B4A68C966}" type="datetimeFigureOut">
               <a:rPr lang="en-US" smtClean="0"/>
-              <a:t>8/31/2023</a:t>
+              <a:t>9/21/2023</a:t>
             </a:fld>
             <a:endParaRPr lang="en-US"/>
           </a:p>
@@ -457,7 +457,7 @@
           <a:p>
             <a:fld id="{0472640E-5220-4745-A811-F41B4A68C966}" type="datetimeFigureOut">
               <a:rPr lang="en-US" smtClean="0"/>
-              <a:t>8/31/2023</a:t>
+              <a:t>9/21/2023</a:t>
             </a:fld>
             <a:endParaRPr lang="en-US"/>
           </a:p>
@@ -665,7 +665,7 @@
           <a:p>
             <a:fld id="{0472640E-5220-4745-A811-F41B4A68C966}" type="datetimeFigureOut">
               <a:rPr lang="en-US" smtClean="0"/>
-              <a:t>8/31/2023</a:t>
+              <a:t>9/21/2023</a:t>
             </a:fld>
             <a:endParaRPr lang="en-US"/>
           </a:p>
@@ -863,7 +863,7 @@
           <a:p>
             <a:fld id="{0472640E-5220-4745-A811-F41B4A68C966}" type="datetimeFigureOut">
               <a:rPr lang="en-US" smtClean="0"/>
-              <a:t>8/31/2023</a:t>
+              <a:t>9/21/2023</a:t>
             </a:fld>
             <a:endParaRPr lang="en-US"/>
           </a:p>
@@ -1138,7 +1138,7 @@
           <a:p>
             <a:fld id="{0472640E-5220-4745-A811-F41B4A68C966}" type="datetimeFigureOut">
               <a:rPr lang="en-US" smtClean="0"/>
-              <a:t>8/31/2023</a:t>
+              <a:t>9/21/2023</a:t>
             </a:fld>
             <a:endParaRPr lang="en-US"/>
           </a:p>
@@ -1403,7 +1403,7 @@
           <a:p>
             <a:fld id="{0472640E-5220-4745-A811-F41B4A68C966}" type="datetimeFigureOut">
               <a:rPr lang="en-US" smtClean="0"/>
-              <a:t>8/31/2023</a:t>
+              <a:t>9/21/2023</a:t>
             </a:fld>
             <a:endParaRPr lang="en-US"/>
           </a:p>
@@ -1815,7 +1815,7 @@
           <a:p>
             <a:fld id="{0472640E-5220-4745-A811-F41B4A68C966}" type="datetimeFigureOut">
               <a:rPr lang="en-US" smtClean="0"/>
-              <a:t>8/31/2023</a:t>
+              <a:t>9/21/2023</a:t>
             </a:fld>
             <a:endParaRPr lang="en-US"/>
           </a:p>
@@ -1956,7 +1956,7 @@
           <a:p>
             <a:fld id="{0472640E-5220-4745-A811-F41B4A68C966}" type="datetimeFigureOut">
               <a:rPr lang="en-US" smtClean="0"/>
-              <a:t>8/31/2023</a:t>
+              <a:t>9/21/2023</a:t>
             </a:fld>
             <a:endParaRPr lang="en-US"/>
           </a:p>
@@ -2069,7 +2069,7 @@
           <a:p>
             <a:fld id="{0472640E-5220-4745-A811-F41B4A68C966}" type="datetimeFigureOut">
               <a:rPr lang="en-US" smtClean="0"/>
-              <a:t>8/31/2023</a:t>
+              <a:t>9/21/2023</a:t>
             </a:fld>
             <a:endParaRPr lang="en-US"/>
           </a:p>
@@ -2380,7 +2380,7 @@
           <a:p>
             <a:fld id="{0472640E-5220-4745-A811-F41B4A68C966}" type="datetimeFigureOut">
               <a:rPr lang="en-US" smtClean="0"/>
-              <a:t>8/31/2023</a:t>
+              <a:t>9/21/2023</a:t>
             </a:fld>
             <a:endParaRPr lang="en-US"/>
           </a:p>
@@ -2668,7 +2668,7 @@
           <a:p>
             <a:fld id="{0472640E-5220-4745-A811-F41B4A68C966}" type="datetimeFigureOut">
               <a:rPr lang="en-US" smtClean="0"/>
-              <a:t>8/31/2023</a:t>
+              <a:t>9/21/2023</a:t>
             </a:fld>
             <a:endParaRPr lang="en-US"/>
           </a:p>
@@ -2909,7 +2909,7 @@
           <a:p>
             <a:fld id="{0472640E-5220-4745-A811-F41B4A68C966}" type="datetimeFigureOut">
               <a:rPr lang="en-US" smtClean="0"/>
-              <a:t>8/31/2023</a:t>
+              <a:t>9/21/2023</a:t>
             </a:fld>
             <a:endParaRPr lang="en-US"/>
           </a:p>
@@ -3340,7 +3340,7 @@
         </p:nvSpPr>
         <p:spPr>
           <a:xfrm>
-            <a:off x="6091081" y="2774946"/>
+            <a:off x="7712063" y="1999007"/>
             <a:ext cx="1092158" cy="1308092"/>
           </a:xfrm>
           <a:prstGeom prst="rect">
@@ -3398,7 +3398,7 @@
         </p:nvSpPr>
         <p:spPr>
           <a:xfrm>
-            <a:off x="4991227" y="2774946"/>
+            <a:off x="6612209" y="1999007"/>
             <a:ext cx="1103412" cy="1308076"/>
           </a:xfrm>
           <a:prstGeom prst="rect">
@@ -3449,7 +3449,7 @@
         </p:nvSpPr>
         <p:spPr>
           <a:xfrm>
-            <a:off x="9326702" y="3559786"/>
+            <a:off x="9202011" y="4998695"/>
             <a:ext cx="1160818" cy="1308092"/>
           </a:xfrm>
           <a:prstGeom prst="rect">
@@ -3500,7 +3500,7 @@
         </p:nvSpPr>
         <p:spPr>
           <a:xfrm>
-            <a:off x="667871" y="3167382"/>
+            <a:off x="543180" y="4606291"/>
             <a:ext cx="1913122" cy="523220"/>
           </a:xfrm>
           <a:prstGeom prst="rect">
@@ -3536,7 +3536,7 @@
         </p:nvSpPr>
         <p:spPr>
           <a:xfrm>
-            <a:off x="7380220" y="3176265"/>
+            <a:off x="7255529" y="4615174"/>
             <a:ext cx="1740050" cy="523220"/>
           </a:xfrm>
           <a:prstGeom prst="rect">
@@ -3575,7 +3575,7 @@
         </p:nvCxnSpPr>
         <p:spPr>
           <a:xfrm flipV="1">
-            <a:off x="2580993" y="3428984"/>
+            <a:off x="2456302" y="4867893"/>
             <a:ext cx="2197579" cy="8"/>
           </a:xfrm>
           <a:prstGeom prst="line">
@@ -3614,7 +3614,7 @@
         </p:nvCxnSpPr>
         <p:spPr>
           <a:xfrm>
-            <a:off x="9120270" y="3437875"/>
+            <a:off x="8995579" y="4876784"/>
             <a:ext cx="2553776" cy="0"/>
           </a:xfrm>
           <a:prstGeom prst="line">
@@ -3650,7 +3650,7 @@
         </p:nvSpPr>
         <p:spPr>
           <a:xfrm>
-            <a:off x="2959738" y="1990091"/>
+            <a:off x="2835047" y="3429000"/>
             <a:ext cx="1428747" cy="1308092"/>
           </a:xfrm>
           <a:prstGeom prst="chord">
@@ -3707,7 +3707,7 @@
         </p:nvSpPr>
         <p:spPr>
           <a:xfrm>
-            <a:off x="2981962" y="3550909"/>
+            <a:off x="2857271" y="4989818"/>
             <a:ext cx="1384298" cy="1308092"/>
           </a:xfrm>
           <a:prstGeom prst="ellipse">
@@ -3762,7 +3762,7 @@
         </p:nvSpPr>
         <p:spPr>
           <a:xfrm>
-            <a:off x="2964656" y="3550909"/>
+            <a:off x="2839965" y="4989818"/>
             <a:ext cx="1428747" cy="1308092"/>
           </a:xfrm>
           <a:prstGeom prst="chord">
@@ -3819,7 +3819,7 @@
         </p:nvSpPr>
         <p:spPr>
           <a:xfrm>
-            <a:off x="9773146" y="1990091"/>
+            <a:off x="9648455" y="3429000"/>
             <a:ext cx="1428747" cy="1308092"/>
           </a:xfrm>
           <a:prstGeom prst="chord">
@@ -3876,7 +3876,7 @@
         </p:nvSpPr>
         <p:spPr>
           <a:xfrm>
-            <a:off x="9773146" y="3559793"/>
+            <a:off x="9648455" y="4998702"/>
             <a:ext cx="1428747" cy="1308092"/>
           </a:xfrm>
           <a:prstGeom prst="chord">
@@ -3933,7 +3933,7 @@
         </p:nvSpPr>
         <p:spPr>
           <a:xfrm>
-            <a:off x="5402871" y="2774954"/>
+            <a:off x="7023853" y="1999015"/>
             <a:ext cx="1384298" cy="1308092"/>
           </a:xfrm>
           <a:prstGeom prst="ellipse">
@@ -3988,7 +3988,7 @@
         </p:nvSpPr>
         <p:spPr>
           <a:xfrm>
-            <a:off x="5381314" y="2774946"/>
+            <a:off x="7002296" y="1999007"/>
             <a:ext cx="1428747" cy="1308092"/>
           </a:xfrm>
           <a:prstGeom prst="chord">
@@ -4027,6 +4027,42 @@
             <a:r>
               <a:rPr lang="en-US" dirty="0"/>
               <a:t>TP</a:t>
+            </a:r>
+          </a:p>
+        </p:txBody>
+      </p:sp>
+      <p:sp>
+        <p:nvSpPr>
+          <p:cNvPr id="2" name="TextBox 1">
+            <a:extLst>
+              <a:ext uri="{FF2B5EF4-FFF2-40B4-BE49-F238E27FC236}">
+                <a16:creationId xmlns:a16="http://schemas.microsoft.com/office/drawing/2014/main" id="{37276DDE-F850-5511-8CB5-D03FE6317669}"/>
+              </a:ext>
+            </a:extLst>
+          </p:cNvPr>
+          <p:cNvSpPr txBox="1"/>
+          <p:nvPr/>
+        </p:nvSpPr>
+        <p:spPr>
+          <a:xfrm>
+            <a:off x="3641295" y="2391435"/>
+            <a:ext cx="2840610" cy="523220"/>
+          </a:xfrm>
+          <a:prstGeom prst="rect">
+            <a:avLst/>
+          </a:prstGeom>
+          <a:noFill/>
+        </p:spPr>
+        <p:txBody>
+          <a:bodyPr wrap="square" rtlCol="0">
+            <a:spAutoFit/>
+          </a:bodyPr>
+          <a:lstStyle/>
+          <a:p>
+            <a:pPr algn="ctr"/>
+            <a:r>
+              <a:rPr lang="en-US" sz="2800" dirty="0"/>
+              <a:t>Total Predictions =</a:t>
             </a:r>
           </a:p>
         </p:txBody>

</xml_diff>